<commit_message>
Added design to UML and classes
</commit_message>
<xml_diff>
--- a/DMS_UML.pptx
+++ b/DMS_UML.pptx
@@ -5,8 +5,7 @@
     <p:sldMasterId id="2147483648" r:id="rId1"/>
   </p:sldMasterIdLst>
   <p:sldIdLst>
-    <p:sldId id="256" r:id="rId2"/>
-    <p:sldId id="257" r:id="rId3"/>
+    <p:sldId id="257" r:id="rId2"/>
   </p:sldIdLst>
   <p:sldSz cx="12192000" cy="6858000"/>
   <p:notesSz cx="6858000" cy="9144000"/>
@@ -105,6 +104,11 @@
       </a:defRPr>
     </a:lvl9pPr>
   </p:defaultTextStyle>
+  <p:extLst>
+    <p:ext uri="{EFAFB233-063F-42B5-8137-9DF3F51BA10A}">
+      <p15:sldGuideLst xmlns:p15="http://schemas.microsoft.com/office/powerpoint/2012/main"/>
+    </p:ext>
+  </p:extLst>
 </p:presentation>
 </file>
 
@@ -239,7 +243,7 @@
           <a:p>
             <a:fld id="{C361A108-558A-4728-B327-C9900290C988}" type="datetimeFigureOut">
               <a:rPr lang="en-US" smtClean="0"/>
-              <a:t>2/11/2018</a:t>
+              <a:t>2/17/2018</a:t>
             </a:fld>
             <a:endParaRPr lang="en-US"/>
           </a:p>
@@ -409,7 +413,7 @@
           <a:p>
             <a:fld id="{C361A108-558A-4728-B327-C9900290C988}" type="datetimeFigureOut">
               <a:rPr lang="en-US" smtClean="0"/>
-              <a:t>2/11/2018</a:t>
+              <a:t>2/17/2018</a:t>
             </a:fld>
             <a:endParaRPr lang="en-US"/>
           </a:p>
@@ -589,7 +593,7 @@
           <a:p>
             <a:fld id="{C361A108-558A-4728-B327-C9900290C988}" type="datetimeFigureOut">
               <a:rPr lang="en-US" smtClean="0"/>
-              <a:t>2/11/2018</a:t>
+              <a:t>2/17/2018</a:t>
             </a:fld>
             <a:endParaRPr lang="en-US"/>
           </a:p>
@@ -759,7 +763,7 @@
           <a:p>
             <a:fld id="{C361A108-558A-4728-B327-C9900290C988}" type="datetimeFigureOut">
               <a:rPr lang="en-US" smtClean="0"/>
-              <a:t>2/11/2018</a:t>
+              <a:t>2/17/2018</a:t>
             </a:fld>
             <a:endParaRPr lang="en-US"/>
           </a:p>
@@ -1005,7 +1009,7 @@
           <a:p>
             <a:fld id="{C361A108-558A-4728-B327-C9900290C988}" type="datetimeFigureOut">
               <a:rPr lang="en-US" smtClean="0"/>
-              <a:t>2/11/2018</a:t>
+              <a:t>2/17/2018</a:t>
             </a:fld>
             <a:endParaRPr lang="en-US"/>
           </a:p>
@@ -1237,7 +1241,7 @@
           <a:p>
             <a:fld id="{C361A108-558A-4728-B327-C9900290C988}" type="datetimeFigureOut">
               <a:rPr lang="en-US" smtClean="0"/>
-              <a:t>2/11/2018</a:t>
+              <a:t>2/17/2018</a:t>
             </a:fld>
             <a:endParaRPr lang="en-US"/>
           </a:p>
@@ -1604,7 +1608,7 @@
           <a:p>
             <a:fld id="{C361A108-558A-4728-B327-C9900290C988}" type="datetimeFigureOut">
               <a:rPr lang="en-US" smtClean="0"/>
-              <a:t>2/11/2018</a:t>
+              <a:t>2/17/2018</a:t>
             </a:fld>
             <a:endParaRPr lang="en-US"/>
           </a:p>
@@ -1722,7 +1726,7 @@
           <a:p>
             <a:fld id="{C361A108-558A-4728-B327-C9900290C988}" type="datetimeFigureOut">
               <a:rPr lang="en-US" smtClean="0"/>
-              <a:t>2/11/2018</a:t>
+              <a:t>2/17/2018</a:t>
             </a:fld>
             <a:endParaRPr lang="en-US"/>
           </a:p>
@@ -1817,7 +1821,7 @@
           <a:p>
             <a:fld id="{C361A108-558A-4728-B327-C9900290C988}" type="datetimeFigureOut">
               <a:rPr lang="en-US" smtClean="0"/>
-              <a:t>2/11/2018</a:t>
+              <a:t>2/17/2018</a:t>
             </a:fld>
             <a:endParaRPr lang="en-US"/>
           </a:p>
@@ -2094,7 +2098,7 @@
           <a:p>
             <a:fld id="{C361A108-558A-4728-B327-C9900290C988}" type="datetimeFigureOut">
               <a:rPr lang="en-US" smtClean="0"/>
-              <a:t>2/11/2018</a:t>
+              <a:t>2/17/2018</a:t>
             </a:fld>
             <a:endParaRPr lang="en-US"/>
           </a:p>
@@ -2347,7 +2351,7 @@
           <a:p>
             <a:fld id="{C361A108-558A-4728-B327-C9900290C988}" type="datetimeFigureOut">
               <a:rPr lang="en-US" smtClean="0"/>
-              <a:t>2/11/2018</a:t>
+              <a:t>2/17/2018</a:t>
             </a:fld>
             <a:endParaRPr lang="en-US"/>
           </a:p>
@@ -2560,7 +2564,7 @@
           <a:p>
             <a:fld id="{C361A108-558A-4728-B327-C9900290C988}" type="datetimeFigureOut">
               <a:rPr lang="en-US" smtClean="0"/>
-              <a:t>2/11/2018</a:t>
+              <a:t>2/17/2018</a:t>
             </a:fld>
             <a:endParaRPr lang="en-US"/>
           </a:p>
@@ -2965,74 +2969,6 @@
           <a:chExt cx="0" cy="0"/>
         </a:xfrm>
       </p:grpSpPr>
-      <p:sp>
-        <p:nvSpPr>
-          <p:cNvPr id="2" name="Title 1"/>
-          <p:cNvSpPr>
-            <a:spLocks noGrp="1"/>
-          </p:cNvSpPr>
-          <p:nvPr>
-            <p:ph type="ctrTitle"/>
-          </p:nvPr>
-        </p:nvSpPr>
-        <p:spPr/>
-        <p:txBody>
-          <a:bodyPr/>
-          <a:lstStyle/>
-          <a:p>
-            <a:endParaRPr lang="en-US"/>
-          </a:p>
-        </p:txBody>
-      </p:sp>
-      <p:sp>
-        <p:nvSpPr>
-          <p:cNvPr id="3" name="Subtitle 2"/>
-          <p:cNvSpPr>
-            <a:spLocks noGrp="1"/>
-          </p:cNvSpPr>
-          <p:nvPr>
-            <p:ph type="subTitle" idx="1"/>
-          </p:nvPr>
-        </p:nvSpPr>
-        <p:spPr/>
-        <p:txBody>
-          <a:bodyPr/>
-          <a:lstStyle/>
-          <a:p>
-            <a:endParaRPr lang="en-US"/>
-          </a:p>
-        </p:txBody>
-      </p:sp>
-    </p:spTree>
-    <p:extLst>
-      <p:ext uri="{BB962C8B-B14F-4D97-AF65-F5344CB8AC3E}">
-        <p14:creationId xmlns:p14="http://schemas.microsoft.com/office/powerpoint/2010/main" val="2278651789"/>
-      </p:ext>
-    </p:extLst>
-  </p:cSld>
-  <p:clrMapOvr>
-    <a:masterClrMapping/>
-  </p:clrMapOvr>
-</p:sld>
-</file>
-
-<file path=ppt/slides/slide2.xml><?xml version="1.0" encoding="utf-8"?>
-<p:sld xmlns:a="http://schemas.openxmlformats.org/drawingml/2006/main" xmlns:r="http://schemas.openxmlformats.org/officeDocument/2006/relationships" xmlns:p="http://schemas.openxmlformats.org/presentationml/2006/main">
-  <p:cSld>
-    <p:spTree>
-      <p:nvGrpSpPr>
-        <p:cNvPr id="1" name=""/>
-        <p:cNvGrpSpPr/>
-        <p:nvPr/>
-      </p:nvGrpSpPr>
-      <p:grpSpPr>
-        <a:xfrm>
-          <a:off x="0" y="0"/>
-          <a:ext cx="0" cy="0"/>
-          <a:chOff x="0" y="0"/>
-          <a:chExt cx="0" cy="0"/>
-        </a:xfrm>
-      </p:grpSpPr>
       <p:graphicFrame>
         <p:nvGraphicFramePr>
           <p:cNvPr id="2" name="Table 1"/>
@@ -3042,13 +2978,221 @@
           <p:nvPr>
             <p:extLst>
               <p:ext uri="{D42A27DB-BD31-4B8C-83A1-F6EECF244321}">
-                <p14:modId xmlns:p14="http://schemas.microsoft.com/office/powerpoint/2010/main" val="3134318409"/>
+                <p14:modId xmlns:p14="http://schemas.microsoft.com/office/powerpoint/2010/main" val="1590394708"/>
               </p:ext>
             </p:extLst>
           </p:nvPr>
         </p:nvGraphicFramePr>
         <p:xfrm>
-          <a:off x="7945332" y="-204361"/>
+          <a:off x="7669577" y="107093"/>
+          <a:ext cx="3864707" cy="3093897"/>
+        </p:xfrm>
+        <a:graphic>
+          <a:graphicData uri="http://schemas.openxmlformats.org/drawingml/2006/table">
+            <a:tbl>
+              <a:tblPr firstRow="1" bandRow="1">
+                <a:tableStyleId>{073A0DAA-6AF3-43AB-8588-CEC1D06C72B9}</a:tableStyleId>
+              </a:tblPr>
+              <a:tblGrid>
+                <a:gridCol w="3864707"/>
+              </a:tblGrid>
+              <a:tr h="442137">
+                <a:tc>
+                  <a:txBody>
+                    <a:bodyPr/>
+                    <a:lstStyle/>
+                    <a:p>
+                      <a:r>
+                        <a:rPr lang="en-US" dirty="0" err="1" smtClean="0"/>
+                        <a:t>DataWriter</a:t>
+                      </a:r>
+                      <a:endParaRPr lang="en-US" dirty="0"/>
+                    </a:p>
+                  </a:txBody>
+                  <a:tcPr/>
+                </a:tc>
+              </a:tr>
+              <a:tr h="1698570">
+                <a:tc>
+                  <a:txBody>
+                    <a:bodyPr/>
+                    <a:lstStyle/>
+                    <a:p>
+                      <a:pPr marL="285750" indent="-285750">
+                        <a:buFontTx/>
+                        <a:buChar char="-"/>
+                      </a:pPr>
+                      <a:r>
+                        <a:rPr lang="en-US" baseline="0" dirty="0" err="1" smtClean="0"/>
+                        <a:t>myArray</a:t>
+                      </a:r>
+                      <a:r>
+                        <a:rPr lang="en-US" baseline="0" dirty="0" smtClean="0"/>
+                        <a:t> </a:t>
+                      </a:r>
+                      <a:r>
+                        <a:rPr lang="en-US" baseline="0" dirty="0" smtClean="0"/>
+                        <a:t>: 2d </a:t>
+                      </a:r>
+                      <a:r>
+                        <a:rPr lang="en-US" baseline="0" dirty="0" smtClean="0"/>
+                        <a:t>array</a:t>
+                      </a:r>
+                    </a:p>
+                    <a:p>
+                      <a:pPr marL="285750" marR="0" lvl="0" indent="-285750" algn="l" defTabSz="914400" rtl="0" eaLnBrk="1" fontAlgn="auto" latinLnBrk="0" hangingPunct="1">
+                        <a:lnSpc>
+                          <a:spcPct val="100000"/>
+                        </a:lnSpc>
+                        <a:spcBef>
+                          <a:spcPts val="0"/>
+                        </a:spcBef>
+                        <a:spcAft>
+                          <a:spcPts val="0"/>
+                        </a:spcAft>
+                        <a:buClrTx/>
+                        <a:buSzTx/>
+                        <a:buFontTx/>
+                        <a:buChar char="-"/>
+                        <a:tabLst/>
+                        <a:defRPr/>
+                      </a:pPr>
+                      <a:r>
+                        <a:rPr lang="en-US" dirty="0" smtClean="0"/>
+                        <a:t>filename: string</a:t>
+                      </a:r>
+                    </a:p>
+                    <a:p>
+                      <a:pPr marL="285750" indent="-285750">
+                        <a:buFontTx/>
+                        <a:buChar char="-"/>
+                      </a:pPr>
+                      <a:r>
+                        <a:rPr lang="en-US" dirty="0" smtClean="0"/>
+                        <a:t>cols : </a:t>
+                      </a:r>
+                      <a:r>
+                        <a:rPr lang="en-US" dirty="0" err="1" smtClean="0"/>
+                        <a:t>int</a:t>
+                      </a:r>
+                      <a:r>
+                        <a:rPr lang="en-US" dirty="0" smtClean="0"/>
+                        <a:t> &lt;needed?&gt;</a:t>
+                      </a:r>
+                    </a:p>
+                    <a:p>
+                      <a:pPr marL="285750" indent="-285750">
+                        <a:buFontTx/>
+                        <a:buChar char="-"/>
+                      </a:pPr>
+                      <a:r>
+                        <a:rPr lang="en-US" dirty="0" err="1" smtClean="0"/>
+                        <a:t>csvfile</a:t>
+                      </a:r>
+                      <a:r>
+                        <a:rPr lang="en-US" dirty="0" smtClean="0"/>
+                        <a:t>: csv</a:t>
+                      </a:r>
+                    </a:p>
+                    <a:p>
+                      <a:pPr marL="285750" indent="-285750">
+                        <a:buFontTx/>
+                        <a:buChar char="-"/>
+                      </a:pPr>
+                      <a:r>
+                        <a:rPr lang="en-US" dirty="0" smtClean="0"/>
+                        <a:t>writer: </a:t>
+                      </a:r>
+                      <a:r>
+                        <a:rPr lang="en-US" dirty="0" err="1" smtClean="0"/>
+                        <a:t>obj</a:t>
+                      </a:r>
+                      <a:endParaRPr lang="en-US" dirty="0" smtClean="0"/>
+                    </a:p>
+                    <a:p>
+                      <a:pPr marL="285750" indent="-285750">
+                        <a:buFontTx/>
+                        <a:buChar char="-"/>
+                      </a:pPr>
+                      <a:endParaRPr lang="en-US" baseline="0" dirty="0" smtClean="0"/>
+                    </a:p>
+                  </a:txBody>
+                  <a:tcPr/>
+                </a:tc>
+              </a:tr>
+              <a:tr h="893984">
+                <a:tc>
+                  <a:txBody>
+                    <a:bodyPr/>
+                    <a:lstStyle/>
+                    <a:p>
+                      <a:r>
+                        <a:rPr lang="en-US" dirty="0" err="1" smtClean="0"/>
+                        <a:t>addRow</a:t>
+                      </a:r>
+                      <a:r>
+                        <a:rPr lang="en-US" dirty="0" smtClean="0"/>
+                        <a:t>(array data) </a:t>
+                      </a:r>
+                      <a:r>
+                        <a:rPr lang="en-US" dirty="0" smtClean="0"/>
+                        <a:t>&lt;removed&gt;</a:t>
+                      </a:r>
+                    </a:p>
+                    <a:p>
+                      <a:pPr marL="0" marR="0" lvl="0" indent="0" algn="l" defTabSz="914400" rtl="0" eaLnBrk="1" fontAlgn="auto" latinLnBrk="0" hangingPunct="1">
+                        <a:lnSpc>
+                          <a:spcPct val="100000"/>
+                        </a:lnSpc>
+                        <a:spcBef>
+                          <a:spcPts val="0"/>
+                        </a:spcBef>
+                        <a:spcAft>
+                          <a:spcPts val="0"/>
+                        </a:spcAft>
+                        <a:buClrTx/>
+                        <a:buSzTx/>
+                        <a:buFontTx/>
+                        <a:buNone/>
+                        <a:tabLst/>
+                        <a:defRPr/>
+                      </a:pPr>
+                      <a:r>
+                        <a:rPr lang="en-US" dirty="0" err="1" smtClean="0"/>
+                        <a:t>writeTo</a:t>
+                      </a:r>
+                      <a:r>
+                        <a:rPr lang="en-US" dirty="0" smtClean="0"/>
+                        <a:t>()</a:t>
+                      </a:r>
+                    </a:p>
+                    <a:p>
+                      <a:endParaRPr lang="en-US" dirty="0"/>
+                    </a:p>
+                  </a:txBody>
+                  <a:tcPr/>
+                </a:tc>
+              </a:tr>
+            </a:tbl>
+          </a:graphicData>
+        </a:graphic>
+      </p:graphicFrame>
+      <p:graphicFrame>
+        <p:nvGraphicFramePr>
+          <p:cNvPr id="3" name="Table 2"/>
+          <p:cNvGraphicFramePr>
+            <a:graphicFrameLocks noGrp="1"/>
+          </p:cNvGraphicFramePr>
+          <p:nvPr>
+            <p:extLst>
+              <p:ext uri="{D42A27DB-BD31-4B8C-83A1-F6EECF244321}">
+                <p14:modId xmlns:p14="http://schemas.microsoft.com/office/powerpoint/2010/main" val="337414722"/>
+              </p:ext>
+            </p:extLst>
+          </p:nvPr>
+        </p:nvGraphicFramePr>
+        <p:xfrm>
+          <a:off x="2612909" y="1542377"/>
           <a:ext cx="3864707" cy="3617872"/>
         </p:xfrm>
         <a:graphic>
@@ -3067,8 +3211,8 @@
                     <a:lstStyle/>
                     <a:p>
                       <a:r>
-                        <a:rPr lang="en-US" dirty="0" err="1" smtClean="0"/>
-                        <a:t>DataWriter</a:t>
+                        <a:rPr lang="en-US" dirty="0" smtClean="0"/>
+                        <a:t>Experiment</a:t>
                       </a:r>
                       <a:endParaRPr lang="en-US" dirty="0"/>
                     </a:p>
@@ -3092,12 +3236,17 @@
                       </a:r>
                       <a:r>
                         <a:rPr lang="en-US" baseline="0" dirty="0" err="1" smtClean="0"/>
-                        <a:t>myArray</a:t>
+                        <a:t>myDataWriter</a:t>
                       </a:r>
                       <a:r>
                         <a:rPr lang="en-US" baseline="0" dirty="0" smtClean="0"/>
-                        <a:t> : 2d array</a:t>
-                      </a:r>
+                        <a:t>: </a:t>
+                      </a:r>
+                      <a:r>
+                        <a:rPr lang="en-US" baseline="0" dirty="0" err="1" smtClean="0"/>
+                        <a:t>DataWriter</a:t>
+                      </a:r>
+                      <a:endParaRPr lang="en-US" baseline="0" dirty="0" smtClean="0"/>
                     </a:p>
                   </a:txBody>
                   <a:tcPr/>
@@ -3111,7 +3260,15 @@
                     <a:p>
                       <a:r>
                         <a:rPr lang="en-US" dirty="0" smtClean="0"/>
-                        <a:t>-  filename: string</a:t>
+                        <a:t>-  name:</a:t>
+                      </a:r>
+                      <a:r>
+                        <a:rPr lang="en-US" baseline="0" dirty="0" smtClean="0"/>
+                        <a:t> </a:t>
+                      </a:r>
+                      <a:r>
+                        <a:rPr lang="en-US" baseline="0" dirty="0" smtClean="0"/>
+                        <a:t>string &lt;needed?&gt;</a:t>
                       </a:r>
                       <a:endParaRPr lang="en-US" dirty="0"/>
                     </a:p>
@@ -3127,15 +3284,15 @@
                     <a:p>
                       <a:r>
                         <a:rPr lang="en-US" dirty="0" smtClean="0"/>
-                        <a:t>- cols : </a:t>
+                        <a:t>- </a:t>
                       </a:r>
                       <a:r>
                         <a:rPr lang="en-US" dirty="0" err="1" smtClean="0"/>
-                        <a:t>int</a:t>
-                      </a:r>
-                      <a:r>
-                        <a:rPr lang="en-US" dirty="0" smtClean="0"/>
-                        <a:t> &lt;needed?&gt;</a:t>
+                        <a:t>myCom</a:t>
+                      </a:r>
+                      <a:r>
+                        <a:rPr lang="en-US" baseline="0" dirty="0" smtClean="0"/>
+                        <a:t>: Communicator</a:t>
                       </a:r>
                       <a:endParaRPr lang="en-US" dirty="0"/>
                     </a:p>
@@ -3163,11 +3320,11 @@
                     <a:p>
                       <a:r>
                         <a:rPr lang="en-US" dirty="0" err="1" smtClean="0"/>
-                        <a:t>addRow</a:t>
+                        <a:t>init</a:t>
                       </a:r>
                       <a:r>
                         <a:rPr lang="en-US" dirty="0" smtClean="0"/>
-                        <a:t>(array data) &lt;needed?&gt;</a:t>
+                        <a:t>()</a:t>
                       </a:r>
                       <a:endParaRPr lang="en-US" dirty="0"/>
                     </a:p>
@@ -3187,7 +3344,11 @@
                       </a:r>
                       <a:r>
                         <a:rPr lang="en-US" dirty="0" smtClean="0"/>
-                        <a:t>()</a:t>
+                        <a:t>(filename</a:t>
+                      </a:r>
+                      <a:r>
+                        <a:rPr lang="en-US" dirty="0" smtClean="0"/>
+                        <a:t>) &lt;needed?&gt;</a:t>
                       </a:r>
                       <a:endParaRPr lang="en-US" dirty="0"/>
                     </a:p>
@@ -3213,21 +3374,21 @@
       </p:graphicFrame>
       <p:graphicFrame>
         <p:nvGraphicFramePr>
-          <p:cNvPr id="3" name="Table 2"/>
+          <p:cNvPr id="5" name="Table 4"/>
           <p:cNvGraphicFramePr>
             <a:graphicFrameLocks noGrp="1"/>
           </p:cNvGraphicFramePr>
           <p:nvPr>
             <p:extLst>
               <p:ext uri="{D42A27DB-BD31-4B8C-83A1-F6EECF244321}">
-                <p14:modId xmlns:p14="http://schemas.microsoft.com/office/powerpoint/2010/main" val="857271374"/>
+                <p14:modId xmlns:p14="http://schemas.microsoft.com/office/powerpoint/2010/main" val="2366266619"/>
               </p:ext>
             </p:extLst>
           </p:nvPr>
         </p:nvGraphicFramePr>
         <p:xfrm>
-          <a:off x="350354" y="814148"/>
-          <a:ext cx="3864707" cy="3617872"/>
+          <a:off x="7669578" y="3474183"/>
+          <a:ext cx="3864707" cy="3055107"/>
         </p:xfrm>
         <a:graphic>
           <a:graphicData uri="http://schemas.openxmlformats.org/drawingml/2006/table">
@@ -3238,7 +3399,7 @@
               <a:tblGrid>
                 <a:gridCol w="3864707"/>
               </a:tblGrid>
-              <a:tr h="452234">
+              <a:tr h="442137">
                 <a:tc>
                   <a:txBody>
                     <a:bodyPr/>
@@ -3246,7 +3407,7 @@
                     <a:p>
                       <a:r>
                         <a:rPr lang="en-US" dirty="0" smtClean="0"/>
-                        <a:t>Experiment</a:t>
+                        <a:t>Communicator</a:t>
                       </a:r>
                       <a:endParaRPr lang="en-US" dirty="0"/>
                     </a:p>
@@ -3254,51 +3415,88 @@
                   <a:tcPr/>
                 </a:tc>
               </a:tr>
-              <a:tr h="452234">
+              <a:tr h="1698570">
                 <a:tc>
                   <a:txBody>
                     <a:bodyPr/>
                     <a:lstStyle/>
                     <a:p>
-                      <a:pPr marL="0" indent="0">
+                      <a:pPr marL="285750" indent="-285750">
                         <a:buFontTx/>
-                        <a:buNone/>
+                        <a:buChar char="-"/>
                       </a:pPr>
                       <a:r>
                         <a:rPr lang="en-US" baseline="0" dirty="0" smtClean="0"/>
-                        <a:t>- </a:t>
-                      </a:r>
-                      <a:r>
-                        <a:rPr lang="en-US" baseline="0" dirty="0" err="1" smtClean="0"/>
-                        <a:t>myDataWriter</a:t>
-                      </a:r>
-                      <a:r>
-                        <a:rPr lang="en-US" baseline="0" dirty="0" smtClean="0"/>
-                        <a:t>: </a:t>
-                      </a:r>
-                      <a:r>
-                        <a:rPr lang="en-US" baseline="0" dirty="0" err="1" smtClean="0"/>
-                        <a:t>DataWriter</a:t>
-                      </a:r>
+                        <a:t>&lt;Serial connection&gt;</a:t>
+                      </a:r>
+                    </a:p>
+                    <a:p>
+                      <a:pPr marL="285750" marR="0" lvl="0" indent="-285750" algn="l" defTabSz="914400" rtl="0" eaLnBrk="1" fontAlgn="auto" latinLnBrk="0" hangingPunct="1">
+                        <a:lnSpc>
+                          <a:spcPct val="100000"/>
+                        </a:lnSpc>
+                        <a:spcBef>
+                          <a:spcPts val="0"/>
+                        </a:spcBef>
+                        <a:spcAft>
+                          <a:spcPts val="0"/>
+                        </a:spcAft>
+                        <a:buClrTx/>
+                        <a:buSzTx/>
+                        <a:buFontTx/>
+                        <a:buChar char="-"/>
+                        <a:tabLst/>
+                        <a:defRPr/>
+                      </a:pPr>
+                      <a:r>
+                        <a:rPr lang="en-US" dirty="0" err="1" smtClean="0"/>
+                        <a:t>isConnected</a:t>
+                      </a:r>
+                      <a:r>
+                        <a:rPr lang="en-US" dirty="0" smtClean="0"/>
+                        <a:t>: bool</a:t>
+                      </a:r>
+                    </a:p>
+                    <a:p>
+                      <a:pPr marL="285750" indent="-285750">
+                        <a:buFontTx/>
+                        <a:buChar char="-"/>
+                      </a:pPr>
                       <a:endParaRPr lang="en-US" baseline="0" dirty="0" smtClean="0"/>
                     </a:p>
                   </a:txBody>
                   <a:tcPr/>
                 </a:tc>
               </a:tr>
-              <a:tr h="452234">
+              <a:tr h="893984">
                 <a:tc>
                   <a:txBody>
                     <a:bodyPr/>
                     <a:lstStyle/>
                     <a:p>
                       <a:r>
+                        <a:rPr lang="en-US" dirty="0" err="1" smtClean="0"/>
+                        <a:t>Init</a:t>
+                      </a:r>
+                      <a:r>
                         <a:rPr lang="en-US" dirty="0" smtClean="0"/>
-                        <a:t>-  name:</a:t>
-                      </a:r>
-                      <a:r>
-                        <a:rPr lang="en-US" baseline="0" dirty="0" smtClean="0"/>
-                        <a:t> string</a:t>
+                        <a:t>()</a:t>
+                      </a:r>
+                    </a:p>
+                    <a:p>
+                      <a:r>
+                        <a:rPr lang="en-US" dirty="0" smtClean="0"/>
+                        <a:t>Read()</a:t>
+                      </a:r>
+                    </a:p>
+                    <a:p>
+                      <a:r>
+                        <a:rPr lang="en-US" dirty="0" err="1" smtClean="0"/>
+                        <a:t>checkConnection</a:t>
+                      </a:r>
+                      <a:r>
+                        <a:rPr lang="en-US" dirty="0" smtClean="0"/>
+                        <a:t>()</a:t>
                       </a:r>
                       <a:endParaRPr lang="en-US" dirty="0"/>
                     </a:p>
@@ -3306,23 +3504,137 @@
                   <a:tcPr/>
                 </a:tc>
               </a:tr>
-              <a:tr h="452234">
+            </a:tbl>
+          </a:graphicData>
+        </a:graphic>
+      </p:graphicFrame>
+      <p:cxnSp>
+        <p:nvCxnSpPr>
+          <p:cNvPr id="7" name="Straight Arrow Connector 6"/>
+          <p:cNvCxnSpPr>
+            <a:endCxn id="2" idx="1"/>
+          </p:cNvCxnSpPr>
+          <p:nvPr/>
+        </p:nvCxnSpPr>
+        <p:spPr>
+          <a:xfrm flipV="1">
+            <a:off x="6494585" y="1654041"/>
+            <a:ext cx="1174992" cy="1675313"/>
+          </a:xfrm>
+          <a:prstGeom prst="straightConnector1">
+            <a:avLst/>
+          </a:prstGeom>
+          <a:ln>
+            <a:tailEnd type="triangle"/>
+          </a:ln>
+        </p:spPr>
+        <p:style>
+          <a:lnRef idx="1">
+            <a:schemeClr val="accent1"/>
+          </a:lnRef>
+          <a:fillRef idx="0">
+            <a:schemeClr val="accent1"/>
+          </a:fillRef>
+          <a:effectRef idx="0">
+            <a:schemeClr val="accent1"/>
+          </a:effectRef>
+          <a:fontRef idx="minor">
+            <a:schemeClr val="tx1"/>
+          </a:fontRef>
+        </p:style>
+      </p:cxnSp>
+      <p:cxnSp>
+        <p:nvCxnSpPr>
+          <p:cNvPr id="9" name="Straight Arrow Connector 8"/>
+          <p:cNvCxnSpPr>
+            <a:endCxn id="5" idx="1"/>
+          </p:cNvCxnSpPr>
+          <p:nvPr/>
+        </p:nvCxnSpPr>
+        <p:spPr>
+          <a:xfrm>
+            <a:off x="6477616" y="3351313"/>
+            <a:ext cx="1191962" cy="1650423"/>
+          </a:xfrm>
+          <a:prstGeom prst="straightConnector1">
+            <a:avLst/>
+          </a:prstGeom>
+          <a:ln>
+            <a:tailEnd type="triangle"/>
+          </a:ln>
+        </p:spPr>
+        <p:style>
+          <a:lnRef idx="1">
+            <a:schemeClr val="accent1"/>
+          </a:lnRef>
+          <a:fillRef idx="0">
+            <a:schemeClr val="accent1"/>
+          </a:fillRef>
+          <a:effectRef idx="0">
+            <a:schemeClr val="accent1"/>
+          </a:effectRef>
+          <a:fontRef idx="minor">
+            <a:schemeClr val="tx1"/>
+          </a:fontRef>
+        </p:style>
+      </p:cxnSp>
+      <p:graphicFrame>
+        <p:nvGraphicFramePr>
+          <p:cNvPr id="10" name="Table 9"/>
+          <p:cNvGraphicFramePr>
+            <a:graphicFrameLocks noGrp="1"/>
+          </p:cNvGraphicFramePr>
+          <p:nvPr>
+            <p:extLst>
+              <p:ext uri="{D42A27DB-BD31-4B8C-83A1-F6EECF244321}">
+                <p14:modId xmlns:p14="http://schemas.microsoft.com/office/powerpoint/2010/main" val="310953346"/>
+              </p:ext>
+            </p:extLst>
+          </p:nvPr>
+        </p:nvGraphicFramePr>
+        <p:xfrm>
+          <a:off x="0" y="0"/>
+          <a:ext cx="3643192" cy="1371600"/>
+        </p:xfrm>
+        <a:graphic>
+          <a:graphicData uri="http://schemas.openxmlformats.org/drawingml/2006/table">
+            <a:tbl>
+              <a:tblPr firstRow="1" bandRow="1">
+                <a:tableStyleId>{073A0DAA-6AF3-43AB-8588-CEC1D06C72B9}</a:tableStyleId>
+              </a:tblPr>
+              <a:tblGrid>
+                <a:gridCol w="3643192"/>
+              </a:tblGrid>
+              <a:tr h="226276">
                 <a:tc>
                   <a:txBody>
                     <a:bodyPr/>
                     <a:lstStyle/>
                     <a:p>
+                      <a:pPr marL="0" marR="0" lvl="0" indent="0" algn="l" defTabSz="914400" rtl="0" eaLnBrk="1" fontAlgn="auto" latinLnBrk="0" hangingPunct="1">
+                        <a:lnSpc>
+                          <a:spcPct val="100000"/>
+                        </a:lnSpc>
+                        <a:spcBef>
+                          <a:spcPts val="0"/>
+                        </a:spcBef>
+                        <a:spcAft>
+                          <a:spcPts val="0"/>
+                        </a:spcAft>
+                        <a:buClrTx/>
+                        <a:buSzTx/>
+                        <a:buFontTx/>
+                        <a:buNone/>
+                        <a:tabLst/>
+                        <a:defRPr/>
+                      </a:pPr>
+                      <a:r>
+                        <a:rPr lang="en-US" dirty="0" err="1" smtClean="0"/>
+                        <a:t>experiment_factory</a:t>
+                      </a:r>
                       <a:r>
                         <a:rPr lang="en-US" dirty="0" smtClean="0"/>
-                        <a:t>- </a:t>
-                      </a:r>
-                      <a:r>
-                        <a:rPr lang="en-US" dirty="0" err="1" smtClean="0"/>
-                        <a:t>myCom</a:t>
-                      </a:r>
-                      <a:r>
-                        <a:rPr lang="en-US" baseline="0" dirty="0" smtClean="0"/>
-                        <a:t>: Communicator</a:t>
+                        <a:t> &lt;function&gt;</a:t>
                       </a:r>
                       <a:endParaRPr lang="en-US" dirty="0"/>
                     </a:p>
@@ -3330,59 +3642,34 @@
                   <a:tcPr/>
                 </a:tc>
               </a:tr>
-              <a:tr h="452234">
+              <a:tr h="588053">
                 <a:tc>
                   <a:txBody>
                     <a:bodyPr/>
                     <a:lstStyle/>
                     <a:p>
-                      <a:endParaRPr lang="en-US" dirty="0"/>
+                      <a:pPr marL="285750" indent="-285750">
+                        <a:buFontTx/>
+                        <a:buChar char="-"/>
+                      </a:pPr>
+                      <a:r>
+                        <a:rPr lang="en-US" baseline="0" dirty="0" smtClean="0"/>
+                        <a:t>Produces experiments</a:t>
+                      </a:r>
+                      <a:endParaRPr lang="en-US" dirty="0" smtClean="0"/>
+                    </a:p>
+                    <a:p>
+                      <a:pPr marL="285750" indent="-285750">
+                        <a:buFontTx/>
+                        <a:buChar char="-"/>
+                      </a:pPr>
+                      <a:endParaRPr lang="en-US" baseline="0" dirty="0" smtClean="0"/>
                     </a:p>
                   </a:txBody>
                   <a:tcPr/>
                 </a:tc>
               </a:tr>
-              <a:tr h="452234">
-                <a:tc>
-                  <a:txBody>
-                    <a:bodyPr/>
-                    <a:lstStyle/>
-                    <a:p>
-                      <a:r>
-                        <a:rPr lang="en-US" dirty="0" err="1" smtClean="0"/>
-                        <a:t>init</a:t>
-                      </a:r>
-                      <a:r>
-                        <a:rPr lang="en-US" dirty="0" smtClean="0"/>
-                        <a:t>()</a:t>
-                      </a:r>
-                      <a:endParaRPr lang="en-US" dirty="0"/>
-                    </a:p>
-                  </a:txBody>
-                  <a:tcPr/>
-                </a:tc>
-              </a:tr>
-              <a:tr h="452234">
-                <a:tc>
-                  <a:txBody>
-                    <a:bodyPr/>
-                    <a:lstStyle/>
-                    <a:p>
-                      <a:r>
-                        <a:rPr lang="en-US" dirty="0" err="1" smtClean="0"/>
-                        <a:t>writeTo</a:t>
-                      </a:r>
-                      <a:r>
-                        <a:rPr lang="en-US" dirty="0" smtClean="0"/>
-                        <a:t>(filename)</a:t>
-                      </a:r>
-                      <a:endParaRPr lang="en-US" dirty="0"/>
-                    </a:p>
-                  </a:txBody>
-                  <a:tcPr/>
-                </a:tc>
-              </a:tr>
-              <a:tr h="452234">
+              <a:tr h="309501">
                 <a:tc>
                   <a:txBody>
                     <a:bodyPr/>
@@ -3398,179 +3685,46 @@
           </a:graphicData>
         </a:graphic>
       </p:graphicFrame>
-      <p:graphicFrame>
-        <p:nvGraphicFramePr>
-          <p:cNvPr id="4" name="Table 3"/>
-          <p:cNvGraphicFramePr>
-            <a:graphicFrameLocks noGrp="1"/>
-          </p:cNvGraphicFramePr>
-          <p:nvPr>
-            <p:extLst>
-              <p:ext uri="{D42A27DB-BD31-4B8C-83A1-F6EECF244321}">
-                <p14:modId xmlns:p14="http://schemas.microsoft.com/office/powerpoint/2010/main" val="2415670206"/>
-              </p:ext>
-            </p:extLst>
-          </p:nvPr>
-        </p:nvGraphicFramePr>
-        <p:xfrm>
-          <a:off x="5324962" y="3731095"/>
-          <a:ext cx="3864707" cy="3581322"/>
-        </p:xfrm>
-        <a:graphic>
-          <a:graphicData uri="http://schemas.openxmlformats.org/drawingml/2006/table">
-            <a:tbl>
-              <a:tblPr firstRow="1" bandRow="1">
-                <a:tableStyleId>{073A0DAA-6AF3-43AB-8588-CEC1D06C72B9}</a:tableStyleId>
-              </a:tblPr>
-              <a:tblGrid>
-                <a:gridCol w="3864707"/>
-              </a:tblGrid>
-              <a:tr h="452234">
-                <a:tc>
-                  <a:txBody>
-                    <a:bodyPr/>
-                    <a:lstStyle/>
-                    <a:p>
-                      <a:r>
-                        <a:rPr lang="en-US" dirty="0" smtClean="0"/>
-                        <a:t>Communicator</a:t>
-                      </a:r>
-                      <a:endParaRPr lang="en-US" dirty="0"/>
-                    </a:p>
-                  </a:txBody>
-                  <a:tcPr/>
-                </a:tc>
-              </a:tr>
-              <a:tr h="452234">
-                <a:tc>
-                  <a:txBody>
-                    <a:bodyPr/>
-                    <a:lstStyle/>
-                    <a:p>
-                      <a:pPr marL="0" indent="0">
-                        <a:buFontTx/>
-                        <a:buNone/>
-                      </a:pPr>
-                      <a:r>
-                        <a:rPr lang="en-US" baseline="0" dirty="0" smtClean="0"/>
-                        <a:t>- &lt;serial connection&gt;</a:t>
-                      </a:r>
-                    </a:p>
-                  </a:txBody>
-                  <a:tcPr/>
-                </a:tc>
-              </a:tr>
-              <a:tr h="415684">
-                <a:tc>
-                  <a:txBody>
-                    <a:bodyPr/>
-                    <a:lstStyle/>
-                    <a:p>
-                      <a:r>
-                        <a:rPr lang="en-US" dirty="0" smtClean="0"/>
-                        <a:t>-  </a:t>
-                      </a:r>
-                      <a:r>
-                        <a:rPr lang="en-US" dirty="0" err="1" smtClean="0"/>
-                        <a:t>isConnected</a:t>
-                      </a:r>
-                      <a:r>
-                        <a:rPr lang="en-US" dirty="0" smtClean="0"/>
-                        <a:t>:</a:t>
-                      </a:r>
-                      <a:r>
-                        <a:rPr lang="en-US" baseline="0" dirty="0" smtClean="0"/>
-                        <a:t> bool</a:t>
-                      </a:r>
-                      <a:endParaRPr lang="en-US" dirty="0"/>
-                    </a:p>
-                  </a:txBody>
-                  <a:tcPr/>
-                </a:tc>
-              </a:tr>
-              <a:tr h="452234">
-                <a:tc>
-                  <a:txBody>
-                    <a:bodyPr/>
-                    <a:lstStyle/>
-                    <a:p>
-                      <a:endParaRPr lang="en-US" dirty="0"/>
-                    </a:p>
-                  </a:txBody>
-                  <a:tcPr/>
-                </a:tc>
-              </a:tr>
-              <a:tr h="452234">
-                <a:tc>
-                  <a:txBody>
-                    <a:bodyPr/>
-                    <a:lstStyle/>
-                    <a:p>
-                      <a:endParaRPr lang="en-US" dirty="0"/>
-                    </a:p>
-                  </a:txBody>
-                  <a:tcPr/>
-                </a:tc>
-              </a:tr>
-              <a:tr h="452234">
-                <a:tc>
-                  <a:txBody>
-                    <a:bodyPr/>
-                    <a:lstStyle/>
-                    <a:p>
-                      <a:r>
-                        <a:rPr lang="en-US" dirty="0" err="1" smtClean="0"/>
-                        <a:t>init</a:t>
-                      </a:r>
-                      <a:r>
-                        <a:rPr lang="en-US" dirty="0" smtClean="0"/>
-                        <a:t>()</a:t>
-                      </a:r>
-                      <a:endParaRPr lang="en-US" dirty="0"/>
-                    </a:p>
-                  </a:txBody>
-                  <a:tcPr/>
-                </a:tc>
-              </a:tr>
-              <a:tr h="452234">
-                <a:tc>
-                  <a:txBody>
-                    <a:bodyPr/>
-                    <a:lstStyle/>
-                    <a:p>
-                      <a:r>
-                        <a:rPr lang="en-US" dirty="0" smtClean="0"/>
-                        <a:t>read()</a:t>
-                      </a:r>
-                    </a:p>
-                  </a:txBody>
-                  <a:tcPr/>
-                </a:tc>
-              </a:tr>
-              <a:tr h="452234">
-                <a:tc>
-                  <a:txBody>
-                    <a:bodyPr/>
-                    <a:lstStyle/>
-                    <a:p>
-                      <a:r>
-                        <a:rPr lang="en-US" dirty="0" err="1" smtClean="0"/>
-                        <a:t>checkConnection</a:t>
-                      </a:r>
-                      <a:r>
-                        <a:rPr lang="en-US" dirty="0" smtClean="0"/>
-                        <a:t>()</a:t>
-                      </a:r>
-                      <a:endParaRPr lang="en-US" dirty="0"/>
-                    </a:p>
-                  </a:txBody>
-                  <a:tcPr/>
-                </a:tc>
-              </a:tr>
-            </a:tbl>
-          </a:graphicData>
-        </a:graphic>
-      </p:graphicFrame>
+      <p:sp>
+        <p:nvSpPr>
+          <p:cNvPr id="11" name="Right Arrow 10"/>
+          <p:cNvSpPr/>
+          <p:nvPr/>
+        </p:nvSpPr>
+        <p:spPr>
+          <a:xfrm rot="2365605">
+            <a:off x="1736502" y="1431303"/>
+            <a:ext cx="715108" cy="737467"/>
+          </a:xfrm>
+          <a:prstGeom prst="rightArrow">
+            <a:avLst/>
+          </a:prstGeom>
+        </p:spPr>
+        <p:style>
+          <a:lnRef idx="2">
+            <a:schemeClr val="accent1">
+              <a:shade val="50000"/>
+            </a:schemeClr>
+          </a:lnRef>
+          <a:fillRef idx="1">
+            <a:schemeClr val="accent1"/>
+          </a:fillRef>
+          <a:effectRef idx="0">
+            <a:schemeClr val="accent1"/>
+          </a:effectRef>
+          <a:fontRef idx="minor">
+            <a:schemeClr val="lt1"/>
+          </a:fontRef>
+        </p:style>
+        <p:txBody>
+          <a:bodyPr rtlCol="0" anchor="ctr"/>
+          <a:lstStyle/>
+          <a:p>
+            <a:pPr algn="ctr"/>
+            <a:endParaRPr lang="en-US"/>
+          </a:p>
+        </p:txBody>
+      </p:sp>
     </p:spTree>
     <p:extLst>
       <p:ext uri="{BB962C8B-B14F-4D97-AF65-F5344CB8AC3E}">

</xml_diff>